<commit_message>
docs: update project files
Update project files.
</commit_message>
<xml_diff>
--- a/Project-6-360-Video/storyboardTemplate.pptx
+++ b/Project-6-360-Video/storyboardTemplate.pptx
@@ -288,7 +288,7 @@
           <a:p>
             <a:fld id="{8148E7C1-7431-9142-ADF0-6A96B99018DF}" type="datetimeFigureOut">
               <a:rPr lang="en-US" smtClean="0"/>
-              <a:t>17-04-25</a:t>
+              <a:t>17-05-06</a:t>
             </a:fld>
             <a:endParaRPr lang="en-US"/>
           </a:p>
@@ -458,7 +458,7 @@
           <a:p>
             <a:fld id="{8148E7C1-7431-9142-ADF0-6A96B99018DF}" type="datetimeFigureOut">
               <a:rPr lang="en-US" smtClean="0"/>
-              <a:t>17-04-25</a:t>
+              <a:t>17-05-06</a:t>
             </a:fld>
             <a:endParaRPr lang="en-US"/>
           </a:p>
@@ -638,7 +638,7 @@
           <a:p>
             <a:fld id="{8148E7C1-7431-9142-ADF0-6A96B99018DF}" type="datetimeFigureOut">
               <a:rPr lang="en-US" smtClean="0"/>
-              <a:t>17-04-25</a:t>
+              <a:t>17-05-06</a:t>
             </a:fld>
             <a:endParaRPr lang="en-US"/>
           </a:p>
@@ -808,7 +808,7 @@
           <a:p>
             <a:fld id="{8148E7C1-7431-9142-ADF0-6A96B99018DF}" type="datetimeFigureOut">
               <a:rPr lang="en-US" smtClean="0"/>
-              <a:t>17-04-25</a:t>
+              <a:t>17-05-06</a:t>
             </a:fld>
             <a:endParaRPr lang="en-US"/>
           </a:p>
@@ -1054,7 +1054,7 @@
           <a:p>
             <a:fld id="{8148E7C1-7431-9142-ADF0-6A96B99018DF}" type="datetimeFigureOut">
               <a:rPr lang="en-US" smtClean="0"/>
-              <a:t>17-04-25</a:t>
+              <a:t>17-05-06</a:t>
             </a:fld>
             <a:endParaRPr lang="en-US"/>
           </a:p>
@@ -1342,7 +1342,7 @@
           <a:p>
             <a:fld id="{8148E7C1-7431-9142-ADF0-6A96B99018DF}" type="datetimeFigureOut">
               <a:rPr lang="en-US" smtClean="0"/>
-              <a:t>17-04-25</a:t>
+              <a:t>17-05-06</a:t>
             </a:fld>
             <a:endParaRPr lang="en-US"/>
           </a:p>
@@ -1764,7 +1764,7 @@
           <a:p>
             <a:fld id="{8148E7C1-7431-9142-ADF0-6A96B99018DF}" type="datetimeFigureOut">
               <a:rPr lang="en-US" smtClean="0"/>
-              <a:t>17-04-25</a:t>
+              <a:t>17-05-06</a:t>
             </a:fld>
             <a:endParaRPr lang="en-US"/>
           </a:p>
@@ -1882,7 +1882,7 @@
           <a:p>
             <a:fld id="{8148E7C1-7431-9142-ADF0-6A96B99018DF}" type="datetimeFigureOut">
               <a:rPr lang="en-US" smtClean="0"/>
-              <a:t>17-04-25</a:t>
+              <a:t>17-05-06</a:t>
             </a:fld>
             <a:endParaRPr lang="en-US"/>
           </a:p>
@@ -1977,7 +1977,7 @@
           <a:p>
             <a:fld id="{8148E7C1-7431-9142-ADF0-6A96B99018DF}" type="datetimeFigureOut">
               <a:rPr lang="en-US" smtClean="0"/>
-              <a:t>17-04-25</a:t>
+              <a:t>17-05-06</a:t>
             </a:fld>
             <a:endParaRPr lang="en-US"/>
           </a:p>
@@ -2254,7 +2254,7 @@
           <a:p>
             <a:fld id="{8148E7C1-7431-9142-ADF0-6A96B99018DF}" type="datetimeFigureOut">
               <a:rPr lang="en-US" smtClean="0"/>
-              <a:t>17-04-25</a:t>
+              <a:t>17-05-06</a:t>
             </a:fld>
             <a:endParaRPr lang="en-US"/>
           </a:p>
@@ -2507,7 +2507,7 @@
           <a:p>
             <a:fld id="{8148E7C1-7431-9142-ADF0-6A96B99018DF}" type="datetimeFigureOut">
               <a:rPr lang="en-US" smtClean="0"/>
-              <a:t>17-04-25</a:t>
+              <a:t>17-05-06</a:t>
             </a:fld>
             <a:endParaRPr lang="en-US"/>
           </a:p>
@@ -2720,7 +2720,7 @@
           <a:p>
             <a:fld id="{8148E7C1-7431-9142-ADF0-6A96B99018DF}" type="datetimeFigureOut">
               <a:rPr lang="en-US" smtClean="0"/>
-              <a:t>17-04-25</a:t>
+              <a:t>17-05-06</a:t>
             </a:fld>
             <a:endParaRPr lang="en-US"/>
           </a:p>
@@ -3118,64 +3118,6 @@
           <a:xfrm>
             <a:off x="0" y="899626"/>
             <a:ext cx="8875059" cy="5958373"/>
-          </a:xfrm>
-          <a:prstGeom prst="rect">
-            <a:avLst/>
-          </a:prstGeom>
-        </p:spPr>
-      </p:pic>
-      <p:pic>
-        <p:nvPicPr>
-          <p:cNvPr id="5" name="Picture 4" descr="Screen Shot 2017-04-25 at 6.37.41 PM.png"/>
-          <p:cNvPicPr>
-            <a:picLocks noChangeAspect="1"/>
-          </p:cNvPicPr>
-          <p:nvPr/>
-        </p:nvPicPr>
-        <p:blipFill rotWithShape="1">
-          <a:blip r:embed="rId3">
-            <a:extLst>
-              <a:ext uri="{28A0092B-C50C-407E-A947-70E740481C1C}">
-                <a14:useLocalDpi xmlns:a14="http://schemas.microsoft.com/office/drawing/2010/main" val="0"/>
-              </a:ext>
-            </a:extLst>
-          </a:blip>
-          <a:srcRect l="24656" t="6474" r="53065" b="53264"/>
-          <a:stretch/>
-        </p:blipFill>
-        <p:spPr>
-          <a:xfrm>
-            <a:off x="1699116" y="2134327"/>
-            <a:ext cx="1089747" cy="1112360"/>
-          </a:xfrm>
-          <a:prstGeom prst="rect">
-            <a:avLst/>
-          </a:prstGeom>
-        </p:spPr>
-      </p:pic>
-      <p:pic>
-        <p:nvPicPr>
-          <p:cNvPr id="6" name="Picture 5" descr="Screen Shot 2017-04-25 at 6.37.41 PM.png"/>
-          <p:cNvPicPr>
-            <a:picLocks noChangeAspect="1"/>
-          </p:cNvPicPr>
-          <p:nvPr/>
-        </p:nvPicPr>
-        <p:blipFill rotWithShape="1">
-          <a:blip r:embed="rId3">
-            <a:extLst>
-              <a:ext uri="{28A0092B-C50C-407E-A947-70E740481C1C}">
-                <a14:useLocalDpi xmlns:a14="http://schemas.microsoft.com/office/drawing/2010/main" val="0"/>
-              </a:ext>
-            </a:extLst>
-          </a:blip>
-          <a:srcRect l="24656" t="6474" r="53065" b="53264"/>
-          <a:stretch/>
-        </p:blipFill>
-        <p:spPr>
-          <a:xfrm>
-            <a:off x="6080636" y="2134327"/>
-            <a:ext cx="1089747" cy="1112360"/>
           </a:xfrm>
           <a:prstGeom prst="rect">
             <a:avLst/>

</xml_diff>